<commit_message>
Mockito mocks vs spies
</commit_message>
<xml_diff>
--- a/UnitTest.pptx
+++ b/UnitTest.pptx
@@ -7,7 +7,8 @@
   <p:sldIdLst>
     <p:sldId id="256" r:id="rId2"/>
     <p:sldId id="257" r:id="rId3"/>
-    <p:sldId id="269" r:id="rId4"/>
+    <p:sldId id="270" r:id="rId4"/>
+    <p:sldId id="269" r:id="rId5"/>
   </p:sldIdLst>
   <p:sldSz cx="9144000" cy="6858000" type="screen4x3"/>
   <p:notesSz cx="6858000" cy="9144000"/>
@@ -297,7 +298,7 @@
           <a:p>
             <a:fld id="{8F235549-BF0A-4B98-8561-3786244E808C}" type="datetimeFigureOut">
               <a:rPr lang="en-US" smtClean="0"/>
-              <a:t>4/4/2016</a:t>
+              <a:t>7/6/2017</a:t>
             </a:fld>
             <a:endParaRPr lang="en-US"/>
           </a:p>
@@ -497,7 +498,7 @@
           <a:p>
             <a:fld id="{8F235549-BF0A-4B98-8561-3786244E808C}" type="datetimeFigureOut">
               <a:rPr lang="en-US" smtClean="0"/>
-              <a:t>4/4/2016</a:t>
+              <a:t>7/6/2017</a:t>
             </a:fld>
             <a:endParaRPr lang="en-US"/>
           </a:p>
@@ -672,7 +673,7 @@
           <a:p>
             <a:fld id="{8F235549-BF0A-4B98-8561-3786244E808C}" type="datetimeFigureOut">
               <a:rPr lang="en-US" smtClean="0"/>
-              <a:t>4/4/2016</a:t>
+              <a:t>7/6/2017</a:t>
             </a:fld>
             <a:endParaRPr lang="en-US"/>
           </a:p>
@@ -837,7 +838,7 @@
           <a:p>
             <a:fld id="{8F235549-BF0A-4B98-8561-3786244E808C}" type="datetimeFigureOut">
               <a:rPr lang="en-US" smtClean="0"/>
-              <a:t>4/4/2016</a:t>
+              <a:t>7/6/2017</a:t>
             </a:fld>
             <a:endParaRPr lang="en-US"/>
           </a:p>
@@ -1085,7 +1086,7 @@
           <a:p>
             <a:fld id="{8F235549-BF0A-4B98-8561-3786244E808C}" type="datetimeFigureOut">
               <a:rPr lang="en-US" smtClean="0"/>
-              <a:t>4/4/2016</a:t>
+              <a:t>7/6/2017</a:t>
             </a:fld>
             <a:endParaRPr lang="en-US"/>
           </a:p>
@@ -1403,7 +1404,7 @@
           <a:p>
             <a:fld id="{8F235549-BF0A-4B98-8561-3786244E808C}" type="datetimeFigureOut">
               <a:rPr lang="en-US" smtClean="0"/>
-              <a:t>4/4/2016</a:t>
+              <a:t>7/6/2017</a:t>
             </a:fld>
             <a:endParaRPr lang="en-US"/>
           </a:p>
@@ -1869,7 +1870,7 @@
           <a:p>
             <a:fld id="{8F235549-BF0A-4B98-8561-3786244E808C}" type="datetimeFigureOut">
               <a:rPr lang="en-US" smtClean="0"/>
-              <a:t>4/4/2016</a:t>
+              <a:t>7/6/2017</a:t>
             </a:fld>
             <a:endParaRPr lang="en-US"/>
           </a:p>
@@ -2017,7 +2018,7 @@
           <a:p>
             <a:fld id="{8F235549-BF0A-4B98-8561-3786244E808C}" type="datetimeFigureOut">
               <a:rPr lang="en-US" smtClean="0"/>
-              <a:t>4/4/2016</a:t>
+              <a:t>7/6/2017</a:t>
             </a:fld>
             <a:endParaRPr lang="en-US"/>
           </a:p>
@@ -2107,7 +2108,7 @@
           <a:p>
             <a:fld id="{8F235549-BF0A-4B98-8561-3786244E808C}" type="datetimeFigureOut">
               <a:rPr lang="en-US" smtClean="0"/>
-              <a:t>4/4/2016</a:t>
+              <a:t>7/6/2017</a:t>
             </a:fld>
             <a:endParaRPr lang="en-US"/>
           </a:p>
@@ -2381,7 +2382,7 @@
           <a:p>
             <a:fld id="{8F235549-BF0A-4B98-8561-3786244E808C}" type="datetimeFigureOut">
               <a:rPr lang="en-US" smtClean="0"/>
-              <a:t>4/4/2016</a:t>
+              <a:t>7/6/2017</a:t>
             </a:fld>
             <a:endParaRPr lang="en-US"/>
           </a:p>
@@ -2686,7 +2687,7 @@
           <a:p>
             <a:fld id="{8F235549-BF0A-4B98-8561-3786244E808C}" type="datetimeFigureOut">
               <a:rPr lang="en-US" smtClean="0"/>
-              <a:t>4/4/2016</a:t>
+              <a:t>7/6/2017</a:t>
             </a:fld>
             <a:endParaRPr lang="en-US"/>
           </a:p>
@@ -2984,7 +2985,7 @@
           <a:p>
             <a:fld id="{8F235549-BF0A-4B98-8561-3786244E808C}" type="datetimeFigureOut">
               <a:rPr lang="en-US" smtClean="0"/>
-              <a:t>4/4/2016</a:t>
+              <a:t>7/6/2017</a:t>
             </a:fld>
             <a:endParaRPr lang="en-US"/>
           </a:p>
@@ -3568,6 +3569,615 @@
           <a:p>
             <a:r>
               <a:rPr lang="en-US" dirty="0" smtClean="0"/>
+              <a:t>Mockito Mocks Vs Spies</a:t>
+            </a:r>
+            <a:endParaRPr lang="en-US" dirty="0"/>
+          </a:p>
+        </p:txBody>
+      </p:sp>
+      <p:graphicFrame>
+        <p:nvGraphicFramePr>
+          <p:cNvPr id="4" name="Content Placeholder 3"/>
+          <p:cNvGraphicFramePr>
+            <a:graphicFrameLocks noGrp="1"/>
+          </p:cNvGraphicFramePr>
+          <p:nvPr>
+            <p:ph idx="1"/>
+            <p:extLst>
+              <p:ext uri="{D42A27DB-BD31-4B8C-83A1-F6EECF244321}">
+                <p14:modId xmlns:p14="http://schemas.microsoft.com/office/powerpoint/2010/main" val="3335679656"/>
+              </p:ext>
+            </p:extLst>
+          </p:nvPr>
+        </p:nvGraphicFramePr>
+        <p:xfrm>
+          <a:off x="457200" y="1600200"/>
+          <a:ext cx="8147248" cy="4745918"/>
+        </p:xfrm>
+        <a:graphic>
+          <a:graphicData uri="http://schemas.openxmlformats.org/drawingml/2006/table">
+            <a:tbl>
+              <a:tblPr firstRow="1" bandRow="1">
+                <a:tableStyleId>{5C22544A-7EE6-4342-B048-85BDC9FD1C3A}</a:tableStyleId>
+              </a:tblPr>
+              <a:tblGrid>
+                <a:gridCol w="4073624"/>
+                <a:gridCol w="4073624"/>
+              </a:tblGrid>
+              <a:tr h="328962">
+                <a:tc>
+                  <a:txBody>
+                    <a:bodyPr/>
+                    <a:lstStyle/>
+                    <a:p>
+                      <a:r>
+                        <a:rPr lang="en-GB" dirty="0" smtClean="0">
+                          <a:solidFill>
+                            <a:schemeClr val="tx1"/>
+                          </a:solidFill>
+                        </a:rPr>
+                        <a:t>Mocks</a:t>
+                      </a:r>
+                      <a:endParaRPr lang="en-GB" dirty="0">
+                        <a:solidFill>
+                          <a:schemeClr val="tx1"/>
+                        </a:solidFill>
+                      </a:endParaRPr>
+                    </a:p>
+                  </a:txBody>
+                  <a:tcPr>
+                    <a:lnL w="12700" cap="flat" cmpd="sng" algn="ctr">
+                      <a:solidFill>
+                        <a:schemeClr val="tx1"/>
+                      </a:solidFill>
+                      <a:prstDash val="solid"/>
+                      <a:round/>
+                      <a:headEnd type="none" w="med" len="med"/>
+                      <a:tailEnd type="none" w="med" len="med"/>
+                    </a:lnL>
+                    <a:lnR w="12700" cap="flat" cmpd="sng" algn="ctr">
+                      <a:solidFill>
+                        <a:schemeClr val="tx1"/>
+                      </a:solidFill>
+                      <a:prstDash val="solid"/>
+                      <a:round/>
+                      <a:headEnd type="none" w="med" len="med"/>
+                      <a:tailEnd type="none" w="med" len="med"/>
+                    </a:lnR>
+                    <a:lnT w="12700" cap="flat" cmpd="sng" algn="ctr">
+                      <a:solidFill>
+                        <a:schemeClr val="tx1"/>
+                      </a:solidFill>
+                      <a:prstDash val="solid"/>
+                      <a:round/>
+                      <a:headEnd type="none" w="med" len="med"/>
+                      <a:tailEnd type="none" w="med" len="med"/>
+                    </a:lnT>
+                    <a:lnB w="12700" cap="flat" cmpd="sng" algn="ctr">
+                      <a:solidFill>
+                        <a:schemeClr val="tx1"/>
+                      </a:solidFill>
+                      <a:prstDash val="solid"/>
+                      <a:round/>
+                      <a:headEnd type="none" w="med" len="med"/>
+                      <a:tailEnd type="none" w="med" len="med"/>
+                    </a:lnB>
+                  </a:tcPr>
+                </a:tc>
+                <a:tc>
+                  <a:txBody>
+                    <a:bodyPr/>
+                    <a:lstStyle/>
+                    <a:p>
+                      <a:r>
+                        <a:rPr lang="en-GB" dirty="0" smtClean="0">
+                          <a:solidFill>
+                            <a:schemeClr val="tx1"/>
+                          </a:solidFill>
+                        </a:rPr>
+                        <a:t>Spies</a:t>
+                      </a:r>
+                      <a:endParaRPr lang="en-GB" dirty="0">
+                        <a:solidFill>
+                          <a:schemeClr val="tx1"/>
+                        </a:solidFill>
+                      </a:endParaRPr>
+                    </a:p>
+                  </a:txBody>
+                  <a:tcPr>
+                    <a:lnL w="12700" cap="flat" cmpd="sng" algn="ctr">
+                      <a:solidFill>
+                        <a:schemeClr val="tx1"/>
+                      </a:solidFill>
+                      <a:prstDash val="solid"/>
+                      <a:round/>
+                      <a:headEnd type="none" w="med" len="med"/>
+                      <a:tailEnd type="none" w="med" len="med"/>
+                    </a:lnL>
+                    <a:lnR w="12700" cap="flat" cmpd="sng" algn="ctr">
+                      <a:solidFill>
+                        <a:schemeClr val="tx1"/>
+                      </a:solidFill>
+                      <a:prstDash val="solid"/>
+                      <a:round/>
+                      <a:headEnd type="none" w="med" len="med"/>
+                      <a:tailEnd type="none" w="med" len="med"/>
+                    </a:lnR>
+                    <a:lnT w="12700" cap="flat" cmpd="sng" algn="ctr">
+                      <a:solidFill>
+                        <a:schemeClr val="tx1"/>
+                      </a:solidFill>
+                      <a:prstDash val="solid"/>
+                      <a:round/>
+                      <a:headEnd type="none" w="med" len="med"/>
+                      <a:tailEnd type="none" w="med" len="med"/>
+                    </a:lnT>
+                    <a:lnB w="12700" cap="flat" cmpd="sng" algn="ctr">
+                      <a:solidFill>
+                        <a:schemeClr val="tx1"/>
+                      </a:solidFill>
+                      <a:prstDash val="solid"/>
+                      <a:round/>
+                      <a:headEnd type="none" w="med" len="med"/>
+                      <a:tailEnd type="none" w="med" len="med"/>
+                    </a:lnB>
+                  </a:tcPr>
+                </a:tc>
+              </a:tr>
+              <a:tr h="1541167">
+                <a:tc>
+                  <a:txBody>
+                    <a:bodyPr/>
+                    <a:lstStyle/>
+                    <a:p>
+                      <a:r>
+                        <a:rPr lang="en-GB" sz="1400" b="0" i="0" kern="1200" dirty="0" smtClean="0">
+                          <a:solidFill>
+                            <a:schemeClr val="dk1"/>
+                          </a:solidFill>
+                          <a:effectLst/>
+                          <a:latin typeface="+mn-lt"/>
+                          <a:ea typeface="+mn-ea"/>
+                          <a:cs typeface="+mn-cs"/>
+                        </a:rPr>
+                        <a:t>Mock object verifies that it (the mock object) is being used correctly by the object under test</a:t>
+                      </a:r>
+                      <a:endParaRPr lang="en-GB" sz="1400" dirty="0"/>
+                    </a:p>
+                  </a:txBody>
+                  <a:tcPr>
+                    <a:lnL w="12700" cap="flat" cmpd="sng" algn="ctr">
+                      <a:solidFill>
+                        <a:schemeClr val="tx1"/>
+                      </a:solidFill>
+                      <a:prstDash val="solid"/>
+                      <a:round/>
+                      <a:headEnd type="none" w="med" len="med"/>
+                      <a:tailEnd type="none" w="med" len="med"/>
+                    </a:lnL>
+                    <a:lnR w="12700" cap="flat" cmpd="sng" algn="ctr">
+                      <a:solidFill>
+                        <a:schemeClr val="tx1"/>
+                      </a:solidFill>
+                      <a:prstDash val="solid"/>
+                      <a:round/>
+                      <a:headEnd type="none" w="med" len="med"/>
+                      <a:tailEnd type="none" w="med" len="med"/>
+                    </a:lnR>
+                    <a:lnT w="12700" cap="flat" cmpd="sng" algn="ctr">
+                      <a:solidFill>
+                        <a:schemeClr val="tx1"/>
+                      </a:solidFill>
+                      <a:prstDash val="solid"/>
+                      <a:round/>
+                      <a:headEnd type="none" w="med" len="med"/>
+                      <a:tailEnd type="none" w="med" len="med"/>
+                    </a:lnT>
+                    <a:lnB w="12700" cap="flat" cmpd="sng" algn="ctr">
+                      <a:solidFill>
+                        <a:schemeClr val="tx1"/>
+                      </a:solidFill>
+                      <a:prstDash val="solid"/>
+                      <a:round/>
+                      <a:headEnd type="none" w="med" len="med"/>
+                      <a:tailEnd type="none" w="med" len="med"/>
+                    </a:lnB>
+                  </a:tcPr>
+                </a:tc>
+                <a:tc>
+                  <a:txBody>
+                    <a:bodyPr/>
+                    <a:lstStyle/>
+                    <a:p>
+                      <a:r>
+                        <a:rPr lang="en-GB" sz="1400" b="0" i="0" kern="1200" dirty="0" smtClean="0">
+                          <a:solidFill>
+                            <a:schemeClr val="dk1"/>
+                          </a:solidFill>
+                          <a:effectLst/>
+                          <a:latin typeface="+mn-lt"/>
+                          <a:ea typeface="+mn-ea"/>
+                          <a:cs typeface="+mn-cs"/>
+                        </a:rPr>
+                        <a:t>Spies, on the other hand, provides a way to spy on a real object. With a spy, you can call all the real underlying methods of the object while still tracking every interaction, just as you would with a mock.</a:t>
+                      </a:r>
+                    </a:p>
+                  </a:txBody>
+                  <a:tcPr>
+                    <a:lnL w="12700" cap="flat" cmpd="sng" algn="ctr">
+                      <a:solidFill>
+                        <a:schemeClr val="tx1"/>
+                      </a:solidFill>
+                      <a:prstDash val="solid"/>
+                      <a:round/>
+                      <a:headEnd type="none" w="med" len="med"/>
+                      <a:tailEnd type="none" w="med" len="med"/>
+                    </a:lnL>
+                    <a:lnR w="12700" cap="flat" cmpd="sng" algn="ctr">
+                      <a:solidFill>
+                        <a:schemeClr val="tx1"/>
+                      </a:solidFill>
+                      <a:prstDash val="solid"/>
+                      <a:round/>
+                      <a:headEnd type="none" w="med" len="med"/>
+                      <a:tailEnd type="none" w="med" len="med"/>
+                    </a:lnR>
+                    <a:lnT w="12700" cap="flat" cmpd="sng" algn="ctr">
+                      <a:solidFill>
+                        <a:schemeClr val="tx1"/>
+                      </a:solidFill>
+                      <a:prstDash val="solid"/>
+                      <a:round/>
+                      <a:headEnd type="none" w="med" len="med"/>
+                      <a:tailEnd type="none" w="med" len="med"/>
+                    </a:lnT>
+                    <a:lnB w="12700" cap="flat" cmpd="sng" algn="ctr">
+                      <a:solidFill>
+                        <a:schemeClr val="tx1"/>
+                      </a:solidFill>
+                      <a:prstDash val="solid"/>
+                      <a:round/>
+                      <a:headEnd type="none" w="med" len="med"/>
+                      <a:tailEnd type="none" w="med" len="med"/>
+                    </a:lnB>
+                  </a:tcPr>
+                </a:tc>
+              </a:tr>
+              <a:tr h="1297824">
+                <a:tc>
+                  <a:txBody>
+                    <a:bodyPr/>
+                    <a:lstStyle/>
+                    <a:p>
+                      <a:r>
+                        <a:rPr lang="en-GB" sz="1400" dirty="0" smtClean="0"/>
+                        <a:t>Stubs the return object</a:t>
+                      </a:r>
+                      <a:endParaRPr lang="en-GB" sz="1400" dirty="0"/>
+                    </a:p>
+                  </a:txBody>
+                  <a:tcPr>
+                    <a:lnL w="12700" cap="flat" cmpd="sng" algn="ctr">
+                      <a:solidFill>
+                        <a:schemeClr val="tx1"/>
+                      </a:solidFill>
+                      <a:prstDash val="solid"/>
+                      <a:round/>
+                      <a:headEnd type="none" w="med" len="med"/>
+                      <a:tailEnd type="none" w="med" len="med"/>
+                    </a:lnL>
+                    <a:lnR w="12700" cap="flat" cmpd="sng" algn="ctr">
+                      <a:solidFill>
+                        <a:schemeClr val="tx1"/>
+                      </a:solidFill>
+                      <a:prstDash val="solid"/>
+                      <a:round/>
+                      <a:headEnd type="none" w="med" len="med"/>
+                      <a:tailEnd type="none" w="med" len="med"/>
+                    </a:lnR>
+                    <a:lnT w="12700" cap="flat" cmpd="sng" algn="ctr">
+                      <a:solidFill>
+                        <a:schemeClr val="tx1"/>
+                      </a:solidFill>
+                      <a:prstDash val="solid"/>
+                      <a:round/>
+                      <a:headEnd type="none" w="med" len="med"/>
+                      <a:tailEnd type="none" w="med" len="med"/>
+                    </a:lnT>
+                    <a:lnB w="12700" cap="flat" cmpd="sng" algn="ctr">
+                      <a:solidFill>
+                        <a:schemeClr val="tx1"/>
+                      </a:solidFill>
+                      <a:prstDash val="solid"/>
+                      <a:round/>
+                      <a:headEnd type="none" w="med" len="med"/>
+                      <a:tailEnd type="none" w="med" len="med"/>
+                    </a:lnB>
+                  </a:tcPr>
+                </a:tc>
+                <a:tc>
+                  <a:txBody>
+                    <a:bodyPr/>
+                    <a:lstStyle/>
+                    <a:p>
+                      <a:r>
+                        <a:rPr lang="en-GB" sz="1400" b="0" i="0" kern="1200" dirty="0" smtClean="0">
+                          <a:solidFill>
+                            <a:schemeClr val="dk1"/>
+                          </a:solidFill>
+                          <a:effectLst/>
+                          <a:latin typeface="+mn-lt"/>
+                          <a:ea typeface="+mn-ea"/>
+                          <a:cs typeface="+mn-cs"/>
+                        </a:rPr>
+                        <a:t>A Mockito spy is a </a:t>
+                      </a:r>
+                      <a:r>
+                        <a:rPr lang="en-GB" sz="1400" b="0" i="0" kern="1200" dirty="0" smtClean="0">
+                          <a:solidFill>
+                            <a:srgbClr val="FF0000"/>
+                          </a:solidFill>
+                          <a:effectLst/>
+                          <a:latin typeface="+mn-lt"/>
+                          <a:ea typeface="+mn-ea"/>
+                          <a:cs typeface="+mn-cs"/>
+                        </a:rPr>
+                        <a:t>partial</a:t>
+                      </a:r>
+                      <a:r>
+                        <a:rPr lang="en-GB" sz="1400" b="0" i="0" kern="1200" dirty="0" smtClean="0">
+                          <a:solidFill>
+                            <a:schemeClr val="dk1"/>
+                          </a:solidFill>
+                          <a:effectLst/>
+                          <a:latin typeface="+mn-lt"/>
+                          <a:ea typeface="+mn-ea"/>
+                          <a:cs typeface="+mn-cs"/>
+                        </a:rPr>
+                        <a:t> mock. We can mock a part of the object by stubbing few methods, while real method invocations will be used for the other. </a:t>
+                      </a:r>
+                      <a:endParaRPr lang="en-GB" sz="1400" dirty="0"/>
+                    </a:p>
+                  </a:txBody>
+                  <a:tcPr>
+                    <a:lnL w="12700" cap="flat" cmpd="sng" algn="ctr">
+                      <a:solidFill>
+                        <a:schemeClr val="tx1"/>
+                      </a:solidFill>
+                      <a:prstDash val="solid"/>
+                      <a:round/>
+                      <a:headEnd type="none" w="med" len="med"/>
+                      <a:tailEnd type="none" w="med" len="med"/>
+                    </a:lnL>
+                    <a:lnR w="12700" cap="flat" cmpd="sng" algn="ctr">
+                      <a:solidFill>
+                        <a:schemeClr val="tx1"/>
+                      </a:solidFill>
+                      <a:prstDash val="solid"/>
+                      <a:round/>
+                      <a:headEnd type="none" w="med" len="med"/>
+                      <a:tailEnd type="none" w="med" len="med"/>
+                    </a:lnR>
+                    <a:lnT w="12700" cap="flat" cmpd="sng" algn="ctr">
+                      <a:solidFill>
+                        <a:schemeClr val="tx1"/>
+                      </a:solidFill>
+                      <a:prstDash val="solid"/>
+                      <a:round/>
+                      <a:headEnd type="none" w="med" len="med"/>
+                      <a:tailEnd type="none" w="med" len="med"/>
+                    </a:lnT>
+                    <a:lnB w="12700" cap="flat" cmpd="sng" algn="ctr">
+                      <a:solidFill>
+                        <a:schemeClr val="tx1"/>
+                      </a:solidFill>
+                      <a:prstDash val="solid"/>
+                      <a:round/>
+                      <a:headEnd type="none" w="med" len="med"/>
+                      <a:tailEnd type="none" w="med" len="med"/>
+                    </a:lnB>
+                  </a:tcPr>
+                </a:tc>
+              </a:tr>
+              <a:tr h="1541167">
+                <a:tc>
+                  <a:txBody>
+                    <a:bodyPr/>
+                    <a:lstStyle/>
+                    <a:p>
+                      <a:r>
+                        <a:rPr lang="en-GB" sz="1400" dirty="0" smtClean="0"/>
+                        <a:t>Faster</a:t>
+                      </a:r>
+                      <a:r>
+                        <a:rPr lang="en-GB" sz="1400" baseline="0" dirty="0" smtClean="0"/>
+                        <a:t> than Spies as it doesn’t create real objects</a:t>
+                      </a:r>
+                      <a:endParaRPr lang="en-GB" sz="1400" dirty="0"/>
+                    </a:p>
+                  </a:txBody>
+                  <a:tcPr>
+                    <a:lnL w="12700" cap="flat" cmpd="sng" algn="ctr">
+                      <a:solidFill>
+                        <a:schemeClr val="tx1"/>
+                      </a:solidFill>
+                      <a:prstDash val="solid"/>
+                      <a:round/>
+                      <a:headEnd type="none" w="med" len="med"/>
+                      <a:tailEnd type="none" w="med" len="med"/>
+                    </a:lnL>
+                    <a:lnR w="12700" cap="flat" cmpd="sng" algn="ctr">
+                      <a:solidFill>
+                        <a:schemeClr val="tx1"/>
+                      </a:solidFill>
+                      <a:prstDash val="solid"/>
+                      <a:round/>
+                      <a:headEnd type="none" w="med" len="med"/>
+                      <a:tailEnd type="none" w="med" len="med"/>
+                    </a:lnR>
+                    <a:lnT w="12700" cap="flat" cmpd="sng" algn="ctr">
+                      <a:solidFill>
+                        <a:schemeClr val="tx1"/>
+                      </a:solidFill>
+                      <a:prstDash val="solid"/>
+                      <a:round/>
+                      <a:headEnd type="none" w="med" len="med"/>
+                      <a:tailEnd type="none" w="med" len="med"/>
+                    </a:lnT>
+                    <a:lnB w="12700" cap="flat" cmpd="sng" algn="ctr">
+                      <a:solidFill>
+                        <a:schemeClr val="tx1"/>
+                      </a:solidFill>
+                      <a:prstDash val="solid"/>
+                      <a:round/>
+                      <a:headEnd type="none" w="med" len="med"/>
+                      <a:tailEnd type="none" w="med" len="med"/>
+                    </a:lnB>
+                  </a:tcPr>
+                </a:tc>
+                <a:tc>
+                  <a:txBody>
+                    <a:bodyPr/>
+                    <a:lstStyle/>
+                    <a:p>
+                      <a:r>
+                        <a:rPr lang="en-GB" sz="1400" b="0" i="0" kern="1200" dirty="0" smtClean="0">
+                          <a:solidFill>
+                            <a:schemeClr val="dk1"/>
+                          </a:solidFill>
+                          <a:effectLst/>
+                          <a:latin typeface="+mn-lt"/>
+                          <a:ea typeface="+mn-ea"/>
+                          <a:cs typeface="+mn-cs"/>
+                        </a:rPr>
+                        <a:t>You won’t require partial mocks for new, test-driven, and well-designed code that follows the </a:t>
+                      </a:r>
+                      <a:r>
+                        <a:rPr lang="en-GB" sz="1400" b="0" i="0" u="none" strike="noStrike" kern="1200" dirty="0" smtClean="0">
+                          <a:solidFill>
+                            <a:schemeClr val="dk1"/>
+                          </a:solidFill>
+                          <a:effectLst/>
+                          <a:latin typeface="+mn-lt"/>
+                          <a:ea typeface="+mn-ea"/>
+                          <a:cs typeface="+mn-cs"/>
+                          <a:hlinkClick r:id="rId2"/>
+                        </a:rPr>
+                        <a:t>Single Responsibility Principle</a:t>
+                      </a:r>
+                      <a:r>
+                        <a:rPr lang="en-GB" sz="1400" b="0" i="0" kern="1200" dirty="0" smtClean="0">
+                          <a:solidFill>
+                            <a:schemeClr val="dk1"/>
+                          </a:solidFill>
+                          <a:effectLst/>
+                          <a:latin typeface="+mn-lt"/>
+                          <a:ea typeface="+mn-ea"/>
+                          <a:cs typeface="+mn-cs"/>
+                        </a:rPr>
+                        <a:t>. Another problem is that when() style stubbing cannot be used on spies. </a:t>
+                      </a:r>
+                      <a:endParaRPr lang="en-GB" sz="1400" dirty="0"/>
+                    </a:p>
+                  </a:txBody>
+                  <a:tcPr>
+                    <a:lnL w="12700" cap="flat" cmpd="sng" algn="ctr">
+                      <a:solidFill>
+                        <a:schemeClr val="tx1"/>
+                      </a:solidFill>
+                      <a:prstDash val="solid"/>
+                      <a:round/>
+                      <a:headEnd type="none" w="med" len="med"/>
+                      <a:tailEnd type="none" w="med" len="med"/>
+                    </a:lnL>
+                    <a:lnR w="12700" cap="flat" cmpd="sng" algn="ctr">
+                      <a:solidFill>
+                        <a:schemeClr val="tx1"/>
+                      </a:solidFill>
+                      <a:prstDash val="solid"/>
+                      <a:round/>
+                      <a:headEnd type="none" w="med" len="med"/>
+                      <a:tailEnd type="none" w="med" len="med"/>
+                    </a:lnR>
+                    <a:lnT w="12700" cap="flat" cmpd="sng" algn="ctr">
+                      <a:solidFill>
+                        <a:schemeClr val="tx1"/>
+                      </a:solidFill>
+                      <a:prstDash val="solid"/>
+                      <a:round/>
+                      <a:headEnd type="none" w="med" len="med"/>
+                      <a:tailEnd type="none" w="med" len="med"/>
+                    </a:lnT>
+                    <a:lnB w="12700" cap="flat" cmpd="sng" algn="ctr">
+                      <a:solidFill>
+                        <a:schemeClr val="tx1"/>
+                      </a:solidFill>
+                      <a:prstDash val="solid"/>
+                      <a:round/>
+                      <a:headEnd type="none" w="med" len="med"/>
+                      <a:tailEnd type="none" w="med" len="med"/>
+                    </a:lnB>
+                  </a:tcPr>
+                </a:tc>
+              </a:tr>
+            </a:tbl>
+          </a:graphicData>
+        </a:graphic>
+      </p:graphicFrame>
+    </p:spTree>
+    <p:extLst>
+      <p:ext uri="{BB962C8B-B14F-4D97-AF65-F5344CB8AC3E}">
+        <p14:creationId xmlns:p14="http://schemas.microsoft.com/office/powerpoint/2010/main" val="47189622"/>
+      </p:ext>
+    </p:extLst>
+  </p:cSld>
+  <p:clrMapOvr>
+    <a:masterClrMapping/>
+  </p:clrMapOvr>
+  <p:timing>
+    <p:tnLst>
+      <p:par>
+        <p:cTn id="1" dur="indefinite" restart="never" nodeType="tmRoot"/>
+      </p:par>
+    </p:tnLst>
+  </p:timing>
+</p:sld>
+</file>
+
+<file path=ppt/slides/slide4.xml><?xml version="1.0" encoding="utf-8"?>
+<p:sld xmlns:a="http://schemas.openxmlformats.org/drawingml/2006/main" xmlns:r="http://schemas.openxmlformats.org/officeDocument/2006/relationships" xmlns:p="http://schemas.openxmlformats.org/presentationml/2006/main">
+  <p:cSld>
+    <p:spTree>
+      <p:nvGrpSpPr>
+        <p:cNvPr id="1" name=""/>
+        <p:cNvGrpSpPr/>
+        <p:nvPr/>
+      </p:nvGrpSpPr>
+      <p:grpSpPr>
+        <a:xfrm>
+          <a:off x="0" y="0"/>
+          <a:ext cx="0" cy="0"/>
+          <a:chOff x="0" y="0"/>
+          <a:chExt cx="0" cy="0"/>
+        </a:xfrm>
+      </p:grpSpPr>
+      <p:sp>
+        <p:nvSpPr>
+          <p:cNvPr id="2" name="Title 1"/>
+          <p:cNvSpPr>
+            <a:spLocks noGrp="1"/>
+          </p:cNvSpPr>
+          <p:nvPr>
+            <p:ph type="title"/>
+          </p:nvPr>
+        </p:nvSpPr>
+        <p:spPr/>
+        <p:txBody>
+          <a:bodyPr/>
+          <a:lstStyle/>
+          <a:p>
+            <a:r>
+              <a:rPr lang="en-US" dirty="0" smtClean="0"/>
               <a:t>References</a:t>
             </a:r>
             <a:endParaRPr lang="en-US" dirty="0"/>
@@ -3592,8 +4202,23 @@
           <a:lstStyle/>
           <a:p>
             <a:r>
+              <a:rPr lang="en-US" sz="1600" dirty="0">
+                <a:hlinkClick r:id="rId2"/>
+              </a:rPr>
+              <a:t>https://</a:t>
+            </a:r>
+            <a:r>
+              <a:rPr lang="en-US" sz="1600" dirty="0" smtClean="0">
+                <a:hlinkClick r:id="rId2"/>
+              </a:rPr>
+              <a:t>code.google.com/archive/p/hamcrest/wikis/Tutorial.wiki</a:t>
+            </a:r>
+            <a:endParaRPr lang="en-US" sz="1600" dirty="0" smtClean="0"/>
+          </a:p>
+          <a:p>
+            <a:r>
               <a:rPr lang="en-US" sz="1600" dirty="0"/>
-              <a:t>https://code.google.com/archive/p/hamcrest/wikis/Tutorial.wiki</a:t>
+              <a:t>https://dzone.com/articles/mockito-mock-vs-spy-in-spring-boot-tests?fromrel=true</a:t>
             </a:r>
             <a:endParaRPr lang="en-US" sz="1600" dirty="0" smtClean="0"/>
           </a:p>

</xml_diff>